<commit_message>
modify Final Presentation Panel
</commit_message>
<xml_diff>
--- a/docs/8_Final Presentation Panel.pptx
+++ b/docs/8_Final Presentation Panel.pptx
@@ -8029,7 +8029,7 @@
         </p:blipFill>
         <p:spPr>
           <a:xfrm>
-            <a:off x="1704027" y="3530095"/>
+            <a:off x="1380027" y="3531437"/>
             <a:ext cx="698587" cy="698587"/>
           </a:xfrm>
           <a:prstGeom prst="rect">
@@ -8045,8 +8045,8 @@
         </p:nvSpPr>
         <p:spPr>
           <a:xfrm>
-            <a:off x="2228648" y="2897937"/>
-            <a:ext cx="2935133" cy="502573"/>
+            <a:off x="1972078" y="2942304"/>
+            <a:ext cx="3095945" cy="502573"/>
           </a:xfrm>
           <a:prstGeom prst="rect">
             <a:avLst/>
@@ -8092,7 +8092,7 @@
         </p:nvSpPr>
         <p:spPr>
           <a:xfrm>
-            <a:off x="2566552" y="3696358"/>
+            <a:off x="2410074" y="3734010"/>
             <a:ext cx="2627243" cy="297454"/>
           </a:xfrm>
           <a:prstGeom prst="rect">
@@ -8124,7 +8124,7 @@
         </p:nvSpPr>
         <p:spPr>
           <a:xfrm>
-            <a:off x="2158430" y="4394764"/>
+            <a:off x="2001952" y="4432416"/>
             <a:ext cx="2894727" cy="502573"/>
           </a:xfrm>
           <a:prstGeom prst="rect">
@@ -8175,7 +8175,7 @@
         </p:nvSpPr>
         <p:spPr>
           <a:xfrm>
-            <a:off x="2420535" y="5239560"/>
+            <a:off x="2264057" y="5277212"/>
             <a:ext cx="2551360" cy="502573"/>
           </a:xfrm>
           <a:prstGeom prst="rect">
@@ -8195,7 +8195,21 @@
                 <a:latin typeface="a옛날목욕탕L" panose="02020600000000000000" pitchFamily="18" charset="-127"/>
                 <a:ea typeface="a옛날목욕탕L" panose="02020600000000000000" pitchFamily="18" charset="-127"/>
               </a:rPr>
-              <a:t>스마트 디바이스 및 프로그램과 연결을 통한 기능적 확장 요구</a:t>
+              <a:t>스마트 디바이스 및 프로그램과 </a:t>
+            </a:r>
+            <a:endParaRPr lang="en-US" altLang="ko-KR" sz="1333" dirty="0">
+              <a:latin typeface="a옛날목욕탕L" panose="02020600000000000000" pitchFamily="18" charset="-127"/>
+              <a:ea typeface="a옛날목욕탕L" panose="02020600000000000000" pitchFamily="18" charset="-127"/>
+            </a:endParaRPr>
+          </a:p>
+          <a:p>
+            <a:pPr algn="ctr"/>
+            <a:r>
+              <a:rPr lang="ko-KR" altLang="en-US" sz="1333" dirty="0">
+                <a:latin typeface="a옛날목욕탕L" panose="02020600000000000000" pitchFamily="18" charset="-127"/>
+                <a:ea typeface="a옛날목욕탕L" panose="02020600000000000000" pitchFamily="18" charset="-127"/>
+              </a:rPr>
+              <a:t>연결을 통한 기능적 확장 요구</a:t>
             </a:r>
           </a:p>
         </p:txBody>
@@ -8444,7 +8458,7 @@
         </p:blipFill>
         <p:spPr>
           <a:xfrm>
-            <a:off x="1766561" y="5242114"/>
+            <a:off x="1442561" y="5243456"/>
             <a:ext cx="528375" cy="528375"/>
           </a:xfrm>
           <a:prstGeom prst="rect">
@@ -8474,7 +8488,7 @@
         </p:blipFill>
         <p:spPr>
           <a:xfrm>
-            <a:off x="1751599" y="4369205"/>
+            <a:off x="1427599" y="4370547"/>
             <a:ext cx="621541" cy="595911"/>
           </a:xfrm>
           <a:prstGeom prst="rect">
@@ -8510,7 +8524,7 @@
         </p:blipFill>
         <p:spPr>
           <a:xfrm>
-            <a:off x="1729196" y="2854388"/>
+            <a:off x="1405196" y="2855730"/>
             <a:ext cx="603103" cy="603103"/>
           </a:xfrm>
           <a:prstGeom prst="rect">

</xml_diff>

<commit_message>
final update to panel
</commit_message>
<xml_diff>
--- a/docs/8_Final Presentation Panel.pptx
+++ b/docs/8_Final Presentation Panel.pptx
@@ -204,7 +204,7 @@
           <a:p>
             <a:fld id="{CE2997ED-12CC-472B-AA05-6D1C9A88BA7B}" type="datetimeFigureOut">
               <a:rPr lang="ko-KR" altLang="en-US" smtClean="0"/>
-              <a:t>19-06-10</a:t>
+              <a:t>2019-06-10</a:t>
             </a:fld>
             <a:endParaRPr lang="ko-KR" altLang="en-US"/>
           </a:p>
@@ -1485,7 +1485,7 @@
           <a:p>
             <a:fld id="{A360C872-B3A7-413C-B014-1411817D9014}" type="datetimeFigureOut">
               <a:rPr lang="ko-KR" altLang="en-US" smtClean="0"/>
-              <a:t>19-06-10</a:t>
+              <a:t>2019-06-10</a:t>
             </a:fld>
             <a:endParaRPr lang="ko-KR" altLang="en-US"/>
           </a:p>
@@ -1683,7 +1683,7 @@
           <a:p>
             <a:fld id="{A360C872-B3A7-413C-B014-1411817D9014}" type="datetimeFigureOut">
               <a:rPr lang="ko-KR" altLang="en-US" smtClean="0"/>
-              <a:t>19-06-10</a:t>
+              <a:t>2019-06-10</a:t>
             </a:fld>
             <a:endParaRPr lang="ko-KR" altLang="en-US"/>
           </a:p>
@@ -1891,7 +1891,7 @@
           <a:p>
             <a:fld id="{A360C872-B3A7-413C-B014-1411817D9014}" type="datetimeFigureOut">
               <a:rPr lang="ko-KR" altLang="en-US" smtClean="0"/>
-              <a:t>19-06-10</a:t>
+              <a:t>2019-06-10</a:t>
             </a:fld>
             <a:endParaRPr lang="ko-KR" altLang="en-US"/>
           </a:p>
@@ -3776,7 +3776,7 @@
           <a:p>
             <a:fld id="{A360C872-B3A7-413C-B014-1411817D9014}" type="datetimeFigureOut">
               <a:rPr lang="ko-KR" altLang="en-US" smtClean="0"/>
-              <a:t>19-06-10</a:t>
+              <a:t>2019-06-10</a:t>
             </a:fld>
             <a:endParaRPr lang="ko-KR" altLang="en-US"/>
           </a:p>
@@ -4051,7 +4051,7 @@
           <a:p>
             <a:fld id="{A360C872-B3A7-413C-B014-1411817D9014}" type="datetimeFigureOut">
               <a:rPr lang="ko-KR" altLang="en-US" smtClean="0"/>
-              <a:t>19-06-10</a:t>
+              <a:t>2019-06-10</a:t>
             </a:fld>
             <a:endParaRPr lang="ko-KR" altLang="en-US"/>
           </a:p>
@@ -4316,7 +4316,7 @@
           <a:p>
             <a:fld id="{A360C872-B3A7-413C-B014-1411817D9014}" type="datetimeFigureOut">
               <a:rPr lang="ko-KR" altLang="en-US" smtClean="0"/>
-              <a:t>19-06-10</a:t>
+              <a:t>2019-06-10</a:t>
             </a:fld>
             <a:endParaRPr lang="ko-KR" altLang="en-US"/>
           </a:p>
@@ -4728,7 +4728,7 @@
           <a:p>
             <a:fld id="{A360C872-B3A7-413C-B014-1411817D9014}" type="datetimeFigureOut">
               <a:rPr lang="ko-KR" altLang="en-US" smtClean="0"/>
-              <a:t>19-06-10</a:t>
+              <a:t>2019-06-10</a:t>
             </a:fld>
             <a:endParaRPr lang="ko-KR" altLang="en-US"/>
           </a:p>
@@ -4869,7 +4869,7 @@
           <a:p>
             <a:fld id="{A360C872-B3A7-413C-B014-1411817D9014}" type="datetimeFigureOut">
               <a:rPr lang="ko-KR" altLang="en-US" smtClean="0"/>
-              <a:t>19-06-10</a:t>
+              <a:t>2019-06-10</a:t>
             </a:fld>
             <a:endParaRPr lang="ko-KR" altLang="en-US"/>
           </a:p>
@@ -4982,7 +4982,7 @@
           <a:p>
             <a:fld id="{A360C872-B3A7-413C-B014-1411817D9014}" type="datetimeFigureOut">
               <a:rPr lang="ko-KR" altLang="en-US" smtClean="0"/>
-              <a:t>19-06-10</a:t>
+              <a:t>2019-06-10</a:t>
             </a:fld>
             <a:endParaRPr lang="ko-KR" altLang="en-US"/>
           </a:p>
@@ -5293,7 +5293,7 @@
           <a:p>
             <a:fld id="{A360C872-B3A7-413C-B014-1411817D9014}" type="datetimeFigureOut">
               <a:rPr lang="ko-KR" altLang="en-US" smtClean="0"/>
-              <a:t>19-06-10</a:t>
+              <a:t>2019-06-10</a:t>
             </a:fld>
             <a:endParaRPr lang="ko-KR" altLang="en-US"/>
           </a:p>
@@ -5581,7 +5581,7 @@
           <a:p>
             <a:fld id="{A360C872-B3A7-413C-B014-1411817D9014}" type="datetimeFigureOut">
               <a:rPr lang="ko-KR" altLang="en-US" smtClean="0"/>
-              <a:t>19-06-10</a:t>
+              <a:t>2019-06-10</a:t>
             </a:fld>
             <a:endParaRPr lang="ko-KR" altLang="en-US"/>
           </a:p>
@@ -5822,7 +5822,7 @@
           <a:p>
             <a:fld id="{A360C872-B3A7-413C-B014-1411817D9014}" type="datetimeFigureOut">
               <a:rPr lang="ko-KR" altLang="en-US" smtClean="0"/>
-              <a:t>19-06-10</a:t>
+              <a:t>2019-06-10</a:t>
             </a:fld>
             <a:endParaRPr lang="ko-KR" altLang="en-US"/>
           </a:p>
@@ -7879,7 +7879,23 @@
                 <a:ea typeface="a옛날목욕탕L" panose="02020600000000000000" pitchFamily="18" charset="-127"/>
                 <a:cs typeface="Arial" panose="020B0604020202020204" pitchFamily="34" charset="0"/>
               </a:rPr>
-              <a:t> 의사소통에는 상당한 어려움이 존재</a:t>
+              <a:t> 의사소통에는 </a:t>
+            </a:r>
+            <a:r>
+              <a:rPr lang="ko-KR" altLang="ko-KR" sz="1467" b="1" dirty="0">
+                <a:latin typeface="a옛날목욕탕L" panose="02020600000000000000" pitchFamily="18" charset="-127"/>
+                <a:ea typeface="a옛날목욕탕L" panose="02020600000000000000" pitchFamily="18" charset="-127"/>
+                <a:cs typeface="Arial" panose="020B0604020202020204" pitchFamily="34" charset="0"/>
+              </a:rPr>
+              <a:t>상당한 어려움</a:t>
+            </a:r>
+            <a:r>
+              <a:rPr lang="ko-KR" altLang="ko-KR" sz="1467" dirty="0">
+                <a:latin typeface="a옛날목욕탕L" panose="02020600000000000000" pitchFamily="18" charset="-127"/>
+                <a:ea typeface="a옛날목욕탕L" panose="02020600000000000000" pitchFamily="18" charset="-127"/>
+                <a:cs typeface="Arial" panose="020B0604020202020204" pitchFamily="34" charset="0"/>
+              </a:rPr>
+              <a:t>이 존재</a:t>
             </a:r>
             <a:r>
               <a:rPr lang="en-US" altLang="ko-KR" sz="1467" dirty="0">
@@ -7968,7 +7984,39 @@
                 <a:ea typeface="a옛날목욕탕L" panose="02020600000000000000" pitchFamily="18" charset="-127"/>
                 <a:cs typeface="Arial" panose="020B0604020202020204" pitchFamily="34" charset="0"/>
               </a:rPr>
-              <a:t>시청각장애인이 비장애인 혹은 장애인 간 실제적인 의사소통이 가능하도록 보조할 수 있고</a:t>
+              <a:t>시청각장애인이 비장애인 혹은 장애인</a:t>
+            </a:r>
+            <a:r>
+              <a:rPr lang="ko-KR" altLang="en-US" sz="1467" dirty="0">
+                <a:latin typeface="a옛날목욕탕L" panose="02020600000000000000" pitchFamily="18" charset="-127"/>
+                <a:ea typeface="a옛날목욕탕L" panose="02020600000000000000" pitchFamily="18" charset="-127"/>
+                <a:cs typeface="Arial" panose="020B0604020202020204" pitchFamily="34" charset="0"/>
+              </a:rPr>
+              <a:t>과</a:t>
+            </a:r>
+            <a:r>
+              <a:rPr lang="ko-KR" altLang="ko-KR" sz="1467" dirty="0">
+                <a:latin typeface="a옛날목욕탕L" panose="02020600000000000000" pitchFamily="18" charset="-127"/>
+                <a:ea typeface="a옛날목욕탕L" panose="02020600000000000000" pitchFamily="18" charset="-127"/>
+                <a:cs typeface="Arial" panose="020B0604020202020204" pitchFamily="34" charset="0"/>
+              </a:rPr>
+              <a:t> </a:t>
+            </a:r>
+            <a:r>
+              <a:rPr lang="ko-KR" altLang="ko-KR" sz="1467" b="1" dirty="0">
+                <a:latin typeface="a옛날목욕탕L" panose="02020600000000000000" pitchFamily="18" charset="-127"/>
+                <a:ea typeface="a옛날목욕탕L" panose="02020600000000000000" pitchFamily="18" charset="-127"/>
+                <a:cs typeface="Arial" panose="020B0604020202020204" pitchFamily="34" charset="0"/>
+              </a:rPr>
+              <a:t>실제적인 의사소통이 가능하도록 보조</a:t>
+            </a:r>
+            <a:r>
+              <a:rPr lang="ko-KR" altLang="ko-KR" sz="1467" dirty="0">
+                <a:latin typeface="a옛날목욕탕L" panose="02020600000000000000" pitchFamily="18" charset="-127"/>
+                <a:ea typeface="a옛날목욕탕L" panose="02020600000000000000" pitchFamily="18" charset="-127"/>
+                <a:cs typeface="Arial" panose="020B0604020202020204" pitchFamily="34" charset="0"/>
+              </a:rPr>
+              <a:t>할 수 있고</a:t>
             </a:r>
             <a:r>
               <a:rPr lang="en-US" altLang="ko-KR" sz="1467" dirty="0">
@@ -7999,7 +8047,23 @@
                 <a:ea typeface="a옛날목욕탕L" panose="02020600000000000000" pitchFamily="18" charset="-127"/>
                 <a:cs typeface="Arial" panose="020B0604020202020204" pitchFamily="34" charset="0"/>
               </a:rPr>
-              <a:t>현존하는 기기들보다 상대적으로 저렴</a:t>
+              <a:t>현존하는 기기들보다 상대적으로 </a:t>
+            </a:r>
+            <a:r>
+              <a:rPr lang="ko-KR" altLang="ko-KR" sz="1467" b="1" dirty="0">
+                <a:latin typeface="a옛날목욕탕L" panose="02020600000000000000" pitchFamily="18" charset="-127"/>
+                <a:ea typeface="a옛날목욕탕L" panose="02020600000000000000" pitchFamily="18" charset="-127"/>
+                <a:cs typeface="Arial" panose="020B0604020202020204" pitchFamily="34" charset="0"/>
+              </a:rPr>
+              <a:t>저렴</a:t>
+            </a:r>
+            <a:r>
+              <a:rPr lang="ko-KR" altLang="en-US" sz="1467" b="1" dirty="0">
+                <a:latin typeface="a옛날목욕탕L" panose="02020600000000000000" pitchFamily="18" charset="-127"/>
+                <a:ea typeface="a옛날목욕탕L" panose="02020600000000000000" pitchFamily="18" charset="-127"/>
+                <a:cs typeface="Arial" panose="020B0604020202020204" pitchFamily="34" charset="0"/>
+              </a:rPr>
+              <a:t>한</a:t>
             </a:r>
             <a:r>
               <a:rPr lang="ko-KR" altLang="en-US" sz="1467" dirty="0">
@@ -8007,7 +8071,7 @@
                 <a:ea typeface="a옛날목욕탕L" panose="02020600000000000000" pitchFamily="18" charset="-127"/>
                 <a:cs typeface="Arial" panose="020B0604020202020204" pitchFamily="34" charset="0"/>
               </a:rPr>
-              <a:t>한 </a:t>
+              <a:t> </a:t>
             </a:r>
             <a:r>
               <a:rPr lang="ko-KR" altLang="ko-KR" sz="1467" dirty="0">
@@ -8057,7 +8121,23 @@
                 <a:ea typeface="a옛날목욕탕L" panose="02020600000000000000" pitchFamily="18" charset="-127"/>
                 <a:cs typeface="Arial" panose="020B0604020202020204" pitchFamily="34" charset="0"/>
               </a:rPr>
-              <a:t>시청각장애인들의 근본적인 의사소통 문제 해결을 위한 서비스를 제공</a:t>
+              <a:t>시청각장애인들의 </a:t>
+            </a:r>
+            <a:r>
+              <a:rPr lang="ko-KR" altLang="en-US" sz="1467" b="1" dirty="0">
+                <a:latin typeface="a옛날목욕탕L" panose="02020600000000000000" pitchFamily="18" charset="-127"/>
+                <a:ea typeface="a옛날목욕탕L" panose="02020600000000000000" pitchFamily="18" charset="-127"/>
+                <a:cs typeface="Arial" panose="020B0604020202020204" pitchFamily="34" charset="0"/>
+              </a:rPr>
+              <a:t>근본적인 의사소통 문제 해결</a:t>
+            </a:r>
+            <a:r>
+              <a:rPr lang="ko-KR" altLang="en-US" sz="1467" dirty="0">
+                <a:latin typeface="a옛날목욕탕L" panose="02020600000000000000" pitchFamily="18" charset="-127"/>
+                <a:ea typeface="a옛날목욕탕L" panose="02020600000000000000" pitchFamily="18" charset="-127"/>
+                <a:cs typeface="Arial" panose="020B0604020202020204" pitchFamily="34" charset="0"/>
+              </a:rPr>
+              <a:t>을 위한 서비스를 제공</a:t>
             </a:r>
             <a:endParaRPr lang="ko-KR" altLang="ko-KR" sz="1467" dirty="0">
               <a:latin typeface="a옛날목욕탕L" panose="02020600000000000000" pitchFamily="18" charset="-127"/>
@@ -9870,7 +9950,7 @@
         </p:nvSpPr>
         <p:spPr>
           <a:xfrm>
-            <a:off x="7832977" y="5119786"/>
+            <a:off x="7797117" y="5119786"/>
             <a:ext cx="2001306" cy="261610"/>
           </a:xfrm>
           <a:prstGeom prst="rect">
@@ -9893,42 +9973,42 @@
           <a:p>
             <a:r>
               <a:rPr lang="en-US" altLang="ko-KR" sz="1050" dirty="0">
-                <a:latin typeface="돋움" panose="020B0600000101010101" pitchFamily="50" charset="-127"/>
-                <a:ea typeface="돋움" panose="020B0600000101010101" pitchFamily="50" charset="-127"/>
+                <a:latin typeface="바탕" panose="02030600000101010101" pitchFamily="18" charset="-127"/>
+                <a:ea typeface="바탕" panose="02030600000101010101" pitchFamily="18" charset="-127"/>
               </a:rPr>
               <a:t>2</a:t>
             </a:r>
             <a:r>
               <a:rPr lang="ko-KR" altLang="en-US" sz="1050" dirty="0">
-                <a:latin typeface="돋움" panose="020B0600000101010101" pitchFamily="50" charset="-127"/>
-                <a:ea typeface="돋움" panose="020B0600000101010101" pitchFamily="50" charset="-127"/>
+                <a:latin typeface="바탕" panose="02030600000101010101" pitchFamily="18" charset="-127"/>
+                <a:ea typeface="바탕" panose="02030600000101010101" pitchFamily="18" charset="-127"/>
               </a:rPr>
               <a:t>종 약자 </a:t>
             </a:r>
             <a:r>
               <a:rPr lang="en-US" altLang="ko-KR" sz="1050" dirty="0">
-                <a:latin typeface="돋움" panose="020B0600000101010101" pitchFamily="50" charset="-127"/>
-                <a:ea typeface="돋움" panose="020B0600000101010101" pitchFamily="50" charset="-127"/>
+                <a:latin typeface="바탕" panose="02030600000101010101" pitchFamily="18" charset="-127"/>
+                <a:ea typeface="바탕" panose="02030600000101010101" pitchFamily="18" charset="-127"/>
               </a:rPr>
               <a:t>‘</a:t>
             </a:r>
             <a:r>
               <a:rPr lang="ko-KR" altLang="en-US" sz="1050" dirty="0">
-                <a:latin typeface="돋움" panose="020B0600000101010101" pitchFamily="50" charset="-127"/>
-                <a:ea typeface="돋움" panose="020B0600000101010101" pitchFamily="50" charset="-127"/>
+                <a:latin typeface="바탕" panose="02030600000101010101" pitchFamily="18" charset="-127"/>
+                <a:ea typeface="바탕" panose="02030600000101010101" pitchFamily="18" charset="-127"/>
               </a:rPr>
               <a:t>그러나</a:t>
             </a:r>
             <a:r>
               <a:rPr lang="en-US" altLang="ko-KR" sz="1050" dirty="0">
-                <a:latin typeface="돋움" panose="020B0600000101010101" pitchFamily="50" charset="-127"/>
-                <a:ea typeface="돋움" panose="020B0600000101010101" pitchFamily="50" charset="-127"/>
+                <a:latin typeface="바탕" panose="02030600000101010101" pitchFamily="18" charset="-127"/>
+                <a:ea typeface="바탕" panose="02030600000101010101" pitchFamily="18" charset="-127"/>
               </a:rPr>
               <a:t>’</a:t>
             </a:r>
             <a:endParaRPr lang="ko-KR" altLang="en-US" sz="1050" dirty="0">
-              <a:latin typeface="돋움" panose="020B0600000101010101" pitchFamily="50" charset="-127"/>
-              <a:ea typeface="돋움" panose="020B0600000101010101" pitchFamily="50" charset="-127"/>
+              <a:latin typeface="바탕" panose="02030600000101010101" pitchFamily="18" charset="-127"/>
+              <a:ea typeface="바탕" panose="02030600000101010101" pitchFamily="18" charset="-127"/>
             </a:endParaRPr>
           </a:p>
         </p:txBody>
@@ -10031,7 +10111,21 @@
                 <a:latin typeface="a옛날목욕탕L" panose="02020600000000000000" pitchFamily="18" charset="-127"/>
                 <a:ea typeface="a옛날목욕탕L" panose="02020600000000000000" pitchFamily="18" charset="-127"/>
               </a:rPr>
-              <a:t>점자 셀에 맞게 점자 버튼을 입력한 후 </a:t>
+              <a:t>점자 셀에 맞게 점자 버튼을 입력한 후</a:t>
+            </a:r>
+            <a:r>
+              <a:rPr lang="en-US" altLang="ko-KR" sz="1600" dirty="0">
+                <a:latin typeface="a옛날목욕탕L" panose="02020600000000000000" pitchFamily="18" charset="-127"/>
+                <a:ea typeface="a옛날목욕탕L" panose="02020600000000000000" pitchFamily="18" charset="-127"/>
+              </a:rPr>
+              <a:t>,</a:t>
+            </a:r>
+            <a:r>
+              <a:rPr lang="ko-KR" altLang="en-US" sz="1600" dirty="0">
+                <a:latin typeface="a옛날목욕탕L" panose="02020600000000000000" pitchFamily="18" charset="-127"/>
+                <a:ea typeface="a옛날목욕탕L" panose="02020600000000000000" pitchFamily="18" charset="-127"/>
+              </a:rPr>
+              <a:t> </a:t>
             </a:r>
             <a:endParaRPr lang="en-US" altLang="ko-KR" sz="1600" dirty="0">
               <a:latin typeface="a옛날목욕탕L" panose="02020600000000000000" pitchFamily="18" charset="-127"/>
@@ -10096,107 +10190,124 @@
               </a:rPr>
               <a:t>하나의 점자 정보 입력이 완료되면</a:t>
             </a:r>
+            <a:r>
+              <a:rPr lang="en-US" altLang="ko-KR" sz="1600" dirty="0">
+                <a:latin typeface="a옛날목욕탕L" panose="02020600000000000000" pitchFamily="18" charset="-127"/>
+                <a:ea typeface="a옛날목욕탕L" panose="02020600000000000000" pitchFamily="18" charset="-127"/>
+              </a:rPr>
+              <a:t>,</a:t>
+            </a:r>
+          </a:p>
+          <a:p>
+            <a:r>
+              <a:rPr lang="en-US" altLang="ko-KR" sz="1600" dirty="0">
+                <a:latin typeface="a옛날목욕탕L" panose="02020600000000000000" pitchFamily="18" charset="-127"/>
+                <a:ea typeface="a옛날목욕탕L" panose="02020600000000000000" pitchFamily="18" charset="-127"/>
+              </a:rPr>
+              <a:t>     send </a:t>
+            </a:r>
+            <a:r>
+              <a:rPr lang="ko-KR" altLang="en-US" sz="1600" dirty="0">
+                <a:latin typeface="a옛날목욕탕L" panose="02020600000000000000" pitchFamily="18" charset="-127"/>
+                <a:ea typeface="a옛날목욕탕L" panose="02020600000000000000" pitchFamily="18" charset="-127"/>
+              </a:rPr>
+              <a:t>버튼을 눌러 점자 정보를 완성한다</a:t>
+            </a:r>
+            <a:r>
+              <a:rPr lang="en-US" altLang="ko-KR" sz="1600" dirty="0">
+                <a:latin typeface="a옛날목욕탕L" panose="02020600000000000000" pitchFamily="18" charset="-127"/>
+                <a:ea typeface="a옛날목욕탕L" panose="02020600000000000000" pitchFamily="18" charset="-127"/>
+              </a:rPr>
+              <a:t>.</a:t>
+            </a:r>
+          </a:p>
+          <a:p>
             <a:endParaRPr lang="en-US" altLang="ko-KR" sz="1600" dirty="0">
               <a:latin typeface="a옛날목욕탕L" panose="02020600000000000000" pitchFamily="18" charset="-127"/>
               <a:ea typeface="a옛날목욕탕L" panose="02020600000000000000" pitchFamily="18" charset="-127"/>
             </a:endParaRPr>
           </a:p>
           <a:p>
+            <a:pPr marL="342900" indent="-342900">
+              <a:buFont typeface="+mj-lt"/>
+              <a:buAutoNum type="arabicPeriod" startAt="3"/>
+            </a:pPr>
+            <a:r>
+              <a:rPr lang="ko-KR" altLang="en-US" sz="1600" dirty="0">
+                <a:latin typeface="a옛날목욕탕L" panose="02020600000000000000" pitchFamily="18" charset="-127"/>
+                <a:ea typeface="a옛날목욕탕L" panose="02020600000000000000" pitchFamily="18" charset="-127"/>
+              </a:rPr>
+              <a:t>모든 점자 정보의 입력이 완료되면</a:t>
+            </a:r>
             <a:r>
               <a:rPr lang="en-US" altLang="ko-KR" sz="1600" dirty="0">
                 <a:latin typeface="a옛날목욕탕L" panose="02020600000000000000" pitchFamily="18" charset="-127"/>
                 <a:ea typeface="a옛날목욕탕L" panose="02020600000000000000" pitchFamily="18" charset="-127"/>
               </a:rPr>
-              <a:t>     send </a:t>
+              <a:t>,</a:t>
             </a:r>
             <a:r>
               <a:rPr lang="ko-KR" altLang="en-US" sz="1600" dirty="0">
                 <a:latin typeface="a옛날목욕탕L" panose="02020600000000000000" pitchFamily="18" charset="-127"/>
                 <a:ea typeface="a옛날목욕탕L" panose="02020600000000000000" pitchFamily="18" charset="-127"/>
               </a:rPr>
-              <a:t>버튼을 눌러 점자정보를 완성한다</a:t>
-            </a:r>
-            <a:r>
-              <a:rPr lang="en-US" altLang="ko-KR" sz="1600" dirty="0">
-                <a:latin typeface="a옛날목욕탕L" panose="02020600000000000000" pitchFamily="18" charset="-127"/>
-                <a:ea typeface="a옛날목욕탕L" panose="02020600000000000000" pitchFamily="18" charset="-127"/>
-              </a:rPr>
-              <a:t>.</a:t>
-            </a:r>
-          </a:p>
-          <a:p>
+              <a:t> </a:t>
+            </a:r>
             <a:endParaRPr lang="en-US" altLang="ko-KR" sz="1600" dirty="0">
               <a:latin typeface="a옛날목욕탕L" panose="02020600000000000000" pitchFamily="18" charset="-127"/>
               <a:ea typeface="a옛날목욕탕L" panose="02020600000000000000" pitchFamily="18" charset="-127"/>
             </a:endParaRPr>
           </a:p>
           <a:p>
-            <a:pPr marL="342900" indent="-342900">
-              <a:buFont typeface="+mj-lt"/>
-              <a:buAutoNum type="arabicPeriod" startAt="3"/>
-            </a:pPr>
+            <a:r>
+              <a:rPr lang="en-US" altLang="ko-KR" sz="1600" dirty="0">
+                <a:latin typeface="a옛날목욕탕L" panose="02020600000000000000" pitchFamily="18" charset="-127"/>
+                <a:ea typeface="a옛날목욕탕L" panose="02020600000000000000" pitchFamily="18" charset="-127"/>
+              </a:rPr>
+              <a:t>     </a:t>
+            </a:r>
             <a:r>
               <a:rPr lang="ko-KR" altLang="en-US" sz="1600" dirty="0">
                 <a:latin typeface="a옛날목욕탕L" panose="02020600000000000000" pitchFamily="18" charset="-127"/>
                 <a:ea typeface="a옛날목욕탕L" panose="02020600000000000000" pitchFamily="18" charset="-127"/>
               </a:rPr>
-              <a:t>모든 점자 정보의 입력이 완료되면 </a:t>
-            </a:r>
+              <a:t>다시 </a:t>
+            </a:r>
+            <a:r>
+              <a:rPr lang="en-US" altLang="ko-KR" sz="1600" dirty="0">
+                <a:latin typeface="a옛날목욕탕L" panose="02020600000000000000" pitchFamily="18" charset="-127"/>
+                <a:ea typeface="a옛날목욕탕L" panose="02020600000000000000" pitchFamily="18" charset="-127"/>
+              </a:rPr>
+              <a:t>send </a:t>
+            </a:r>
+            <a:r>
+              <a:rPr lang="ko-KR" altLang="en-US" sz="1600" dirty="0">
+                <a:latin typeface="a옛날목욕탕L" panose="02020600000000000000" pitchFamily="18" charset="-127"/>
+                <a:ea typeface="a옛날목욕탕L" panose="02020600000000000000" pitchFamily="18" charset="-127"/>
+              </a:rPr>
+              <a:t>버튼을 눌러 전송한다</a:t>
+            </a:r>
+            <a:r>
+              <a:rPr lang="en-US" altLang="ko-KR" sz="1600" dirty="0">
+                <a:latin typeface="a옛날목욕탕L" panose="02020600000000000000" pitchFamily="18" charset="-127"/>
+                <a:ea typeface="a옛날목욕탕L" panose="02020600000000000000" pitchFamily="18" charset="-127"/>
+              </a:rPr>
+              <a:t>.</a:t>
+            </a:r>
+          </a:p>
+          <a:p>
             <a:endParaRPr lang="en-US" altLang="ko-KR" sz="1600" dirty="0">
               <a:latin typeface="a옛날목욕탕L" panose="02020600000000000000" pitchFamily="18" charset="-127"/>
               <a:ea typeface="a옛날목욕탕L" panose="02020600000000000000" pitchFamily="18" charset="-127"/>
             </a:endParaRPr>
           </a:p>
           <a:p>
-            <a:r>
-              <a:rPr lang="en-US" altLang="ko-KR" sz="1600" dirty="0">
-                <a:latin typeface="a옛날목욕탕L" panose="02020600000000000000" pitchFamily="18" charset="-127"/>
-                <a:ea typeface="a옛날목욕탕L" panose="02020600000000000000" pitchFamily="18" charset="-127"/>
-              </a:rPr>
-              <a:t>     </a:t>
-            </a:r>
-            <a:r>
-              <a:rPr lang="ko-KR" altLang="en-US" sz="1600" dirty="0">
-                <a:latin typeface="a옛날목욕탕L" panose="02020600000000000000" pitchFamily="18" charset="-127"/>
-                <a:ea typeface="a옛날목욕탕L" panose="02020600000000000000" pitchFamily="18" charset="-127"/>
-              </a:rPr>
-              <a:t>다시 </a:t>
-            </a:r>
-            <a:r>
-              <a:rPr lang="en-US" altLang="ko-KR" sz="1600" dirty="0">
-                <a:latin typeface="a옛날목욕탕L" panose="02020600000000000000" pitchFamily="18" charset="-127"/>
-                <a:ea typeface="a옛날목욕탕L" panose="02020600000000000000" pitchFamily="18" charset="-127"/>
-              </a:rPr>
-              <a:t>send </a:t>
-            </a:r>
-            <a:r>
-              <a:rPr lang="ko-KR" altLang="en-US" sz="1600" dirty="0">
-                <a:latin typeface="a옛날목욕탕L" panose="02020600000000000000" pitchFamily="18" charset="-127"/>
-                <a:ea typeface="a옛날목욕탕L" panose="02020600000000000000" pitchFamily="18" charset="-127"/>
-              </a:rPr>
-              <a:t>버튼을 눌러 전송한다</a:t>
-            </a:r>
-            <a:r>
-              <a:rPr lang="en-US" altLang="ko-KR" sz="1600" dirty="0">
-                <a:latin typeface="a옛날목욕탕L" panose="02020600000000000000" pitchFamily="18" charset="-127"/>
-                <a:ea typeface="a옛날목욕탕L" panose="02020600000000000000" pitchFamily="18" charset="-127"/>
-              </a:rPr>
-              <a:t>.</a:t>
-            </a:r>
-          </a:p>
-          <a:p>
             <a:endParaRPr lang="en-US" altLang="ko-KR" sz="1600" dirty="0">
               <a:latin typeface="a옛날목욕탕L" panose="02020600000000000000" pitchFamily="18" charset="-127"/>
               <a:ea typeface="a옛날목욕탕L" panose="02020600000000000000" pitchFamily="18" charset="-127"/>
             </a:endParaRPr>
           </a:p>
           <a:p>
-            <a:endParaRPr lang="en-US" altLang="ko-KR" sz="1600" dirty="0">
-              <a:latin typeface="a옛날목욕탕L" panose="02020600000000000000" pitchFamily="18" charset="-127"/>
-              <a:ea typeface="a옛날목욕탕L" panose="02020600000000000000" pitchFamily="18" charset="-127"/>
-            </a:endParaRPr>
-          </a:p>
-          <a:p>
             <a:pPr marL="285750" indent="-285750">
               <a:buFont typeface="Arial" panose="020B0604020202020204" pitchFamily="34" charset="0"/>
               <a:buChar char="•"/>
@@ -10208,10 +10319,13 @@
               </a:rPr>
               <a:t>점자 버튼을 잘못 누른 경우 </a:t>
             </a:r>
-            <a:endParaRPr lang="en-US" altLang="ko-KR" sz="1600" dirty="0">
-              <a:latin typeface="a옛날목욕탕L" panose="02020600000000000000" pitchFamily="18" charset="-127"/>
-              <a:ea typeface="a옛날목욕탕L" panose="02020600000000000000" pitchFamily="18" charset="-127"/>
-            </a:endParaRPr>
+            <a:r>
+              <a:rPr lang="en-US" altLang="ko-KR" sz="1600" dirty="0">
+                <a:latin typeface="a옛날목욕탕L" panose="02020600000000000000" pitchFamily="18" charset="-127"/>
+                <a:ea typeface="a옛날목욕탕L" panose="02020600000000000000" pitchFamily="18" charset="-127"/>
+              </a:rPr>
+              <a:t>,</a:t>
+            </a:r>
           </a:p>
           <a:p>
             <a:r>
@@ -12764,8 +12878,8 @@
         </p:nvSpPr>
         <p:spPr>
           <a:xfrm>
-            <a:off x="7513112" y="1947660"/>
-            <a:ext cx="4562347" cy="4555093"/>
+            <a:off x="7426990" y="1800478"/>
+            <a:ext cx="4562347" cy="4339650"/>
           </a:xfrm>
           <a:prstGeom prst="rect">
             <a:avLst/>
@@ -12872,7 +12986,7 @@
                 <a:latin typeface="a옛날목욕탕L" panose="02020600000000000000" pitchFamily="18" charset="-127"/>
                 <a:ea typeface="a옛날목욕탕L" panose="02020600000000000000" pitchFamily="18" charset="-127"/>
               </a:rPr>
-              <a:t>문자로</a:t>
+              <a:t>해당 음성이 문자로</a:t>
             </a:r>
             <a:r>
               <a:rPr lang="en-US" altLang="ko-KR" sz="1400" dirty="0">
@@ -12930,7 +13044,7 @@
                 <a:latin typeface="a옛날목욕탕L" panose="02020600000000000000" pitchFamily="18" charset="-127"/>
                 <a:ea typeface="a옛날목욕탕L" panose="02020600000000000000" pitchFamily="18" charset="-127"/>
               </a:rPr>
-              <a:t>아이콘을 선택하면 </a:t>
+              <a:t>아이콘을 누르면 </a:t>
             </a:r>
             <a:r>
               <a:rPr lang="en-US" altLang="ko-KR" sz="1400" dirty="0">
@@ -12978,7 +13092,7 @@
                 <a:latin typeface="a옛날목욕탕L" panose="02020600000000000000" pitchFamily="18" charset="-127"/>
                 <a:ea typeface="a옛날목욕탕L" panose="02020600000000000000" pitchFamily="18" charset="-127"/>
               </a:rPr>
-              <a:t>점자 정보로 변환되고</a:t>
+              <a:t>문자 정보가 점자 정보로 변환되고</a:t>
             </a:r>
             <a:r>
               <a:rPr lang="en-US" altLang="ko-KR" sz="1400" dirty="0">
@@ -12987,12 +13101,21 @@
               </a:rPr>
               <a:t>, </a:t>
             </a:r>
+          </a:p>
+          <a:p>
+            <a:r>
+              <a:rPr lang="en-US" altLang="ko-KR" sz="1400" dirty="0">
+                <a:latin typeface="a옛날목욕탕L" panose="02020600000000000000" pitchFamily="18" charset="-127"/>
+                <a:ea typeface="a옛날목욕탕L" panose="02020600000000000000" pitchFamily="18" charset="-127"/>
+              </a:rPr>
+              <a:t>      </a:t>
+            </a:r>
             <a:r>
               <a:rPr lang="ko-KR" altLang="en-US" sz="1400" dirty="0">
                 <a:latin typeface="a옛날목욕탕L" panose="02020600000000000000" pitchFamily="18" charset="-127"/>
                 <a:ea typeface="a옛날목욕탕L" panose="02020600000000000000" pitchFamily="18" charset="-127"/>
               </a:rPr>
-              <a:t>해당 정보는 </a:t>
+              <a:t>해당 점자는 </a:t>
             </a:r>
             <a:r>
               <a:rPr lang="en-US" altLang="ko-KR" sz="1400" dirty="0">
@@ -13006,27 +13129,7 @@
                 <a:latin typeface="a옛날목욕탕L" panose="02020600000000000000" pitchFamily="18" charset="-127"/>
                 <a:ea typeface="a옛날목욕탕L" panose="02020600000000000000" pitchFamily="18" charset="-127"/>
               </a:rPr>
-              <a:t>에 </a:t>
-            </a:r>
-            <a:endParaRPr lang="en-US" altLang="ko-KR" sz="1400" dirty="0">
-              <a:latin typeface="a옛날목욕탕L" panose="02020600000000000000" pitchFamily="18" charset="-127"/>
-              <a:ea typeface="a옛날목욕탕L" panose="02020600000000000000" pitchFamily="18" charset="-127"/>
-            </a:endParaRPr>
-          </a:p>
-          <a:p>
-            <a:r>
-              <a:rPr lang="en-US" altLang="ko-KR" sz="1400" dirty="0">
-                <a:latin typeface="a옛날목욕탕L" panose="02020600000000000000" pitchFamily="18" charset="-127"/>
-                <a:ea typeface="a옛날목욕탕L" panose="02020600000000000000" pitchFamily="18" charset="-127"/>
-              </a:rPr>
-              <a:t>      </a:t>
-            </a:r>
-            <a:r>
-              <a:rPr lang="ko-KR" altLang="en-US" sz="1400" dirty="0">
-                <a:latin typeface="a옛날목욕탕L" panose="02020600000000000000" pitchFamily="18" charset="-127"/>
-                <a:ea typeface="a옛날목욕탕L" panose="02020600000000000000" pitchFamily="18" charset="-127"/>
-              </a:rPr>
-              <a:t>전송된다</a:t>
+              <a:t>에 전송된다</a:t>
             </a:r>
             <a:r>
               <a:rPr lang="en-US" altLang="ko-KR" sz="1400" dirty="0">
@@ -13076,39 +13179,107 @@
               </a:rPr>
               <a:t>점자 입력부를 통해 점자를 입력하고 </a:t>
             </a:r>
+            <a:r>
+              <a:rPr lang="en-US" altLang="ko-KR" sz="1400" dirty="0">
+                <a:latin typeface="a옛날목욕탕L" panose="02020600000000000000" pitchFamily="18" charset="-127"/>
+                <a:ea typeface="a옛날목욕탕L" panose="02020600000000000000" pitchFamily="18" charset="-127"/>
+              </a:rPr>
+              <a:t>Send </a:t>
+            </a:r>
+            <a:r>
+              <a:rPr lang="ko-KR" altLang="en-US" sz="1400" dirty="0">
+                <a:latin typeface="a옛날목욕탕L" panose="02020600000000000000" pitchFamily="18" charset="-127"/>
+                <a:ea typeface="a옛날목욕탕L" panose="02020600000000000000" pitchFamily="18" charset="-127"/>
+              </a:rPr>
+              <a:t>버튼을 </a:t>
+            </a:r>
+            <a:br>
+              <a:rPr lang="en-US" altLang="ko-KR" sz="1400" dirty="0">
+                <a:latin typeface="a옛날목욕탕L" panose="02020600000000000000" pitchFamily="18" charset="-127"/>
+                <a:ea typeface="a옛날목욕탕L" panose="02020600000000000000" pitchFamily="18" charset="-127"/>
+              </a:rPr>
+            </a:br>
+            <a:r>
+              <a:rPr lang="ko-KR" altLang="en-US" sz="1400" dirty="0">
+                <a:latin typeface="a옛날목욕탕L" panose="02020600000000000000" pitchFamily="18" charset="-127"/>
+                <a:ea typeface="a옛날목욕탕L" panose="02020600000000000000" pitchFamily="18" charset="-127"/>
+              </a:rPr>
+              <a:t>누르면 </a:t>
+            </a:r>
+            <a:r>
+              <a:rPr lang="en-US" altLang="ko-KR" sz="1400" dirty="0">
+                <a:latin typeface="a옛날목욕탕L" panose="02020600000000000000" pitchFamily="18" charset="-127"/>
+                <a:ea typeface="a옛날목욕탕L" panose="02020600000000000000" pitchFamily="18" charset="-127"/>
+              </a:rPr>
+              <a:t>Bee Mobile Application</a:t>
+            </a:r>
+            <a:r>
+              <a:rPr lang="ko-KR" altLang="en-US" sz="1400" dirty="0">
+                <a:latin typeface="a옛날목욕탕L" panose="02020600000000000000" pitchFamily="18" charset="-127"/>
+                <a:ea typeface="a옛날목욕탕L" panose="02020600000000000000" pitchFamily="18" charset="-127"/>
+              </a:rPr>
+              <a:t>으로 전송된다</a:t>
+            </a:r>
+            <a:r>
+              <a:rPr lang="en-US" altLang="ko-KR" sz="1400" dirty="0">
+                <a:latin typeface="a옛날목욕탕L" panose="02020600000000000000" pitchFamily="18" charset="-127"/>
+                <a:ea typeface="a옛날목욕탕L" panose="02020600000000000000" pitchFamily="18" charset="-127"/>
+              </a:rPr>
+              <a:t>.</a:t>
+            </a:r>
+          </a:p>
+          <a:p>
             <a:endParaRPr lang="en-US" altLang="ko-KR" sz="1400" dirty="0">
               <a:latin typeface="a옛날목욕탕L" panose="02020600000000000000" pitchFamily="18" charset="-127"/>
               <a:ea typeface="a옛날목욕탕L" panose="02020600000000000000" pitchFamily="18" charset="-127"/>
             </a:endParaRPr>
           </a:p>
           <a:p>
+            <a:pPr marL="342900" indent="-342900">
+              <a:buFont typeface="+mj-ea"/>
+              <a:buAutoNum type="circleNumDbPlain" startAt="2"/>
+            </a:pPr>
             <a:r>
               <a:rPr lang="en-US" altLang="ko-KR" sz="1400" dirty="0">
                 <a:latin typeface="a옛날목욕탕L" panose="02020600000000000000" pitchFamily="18" charset="-127"/>
                 <a:ea typeface="a옛날목욕탕L" panose="02020600000000000000" pitchFamily="18" charset="-127"/>
               </a:rPr>
-              <a:t>      Send </a:t>
+              <a:t>BEE Mobile Application</a:t>
             </a:r>
             <a:r>
               <a:rPr lang="ko-KR" altLang="en-US" sz="1400" dirty="0">
                 <a:latin typeface="a옛날목욕탕L" panose="02020600000000000000" pitchFamily="18" charset="-127"/>
                 <a:ea typeface="a옛날목욕탕L" panose="02020600000000000000" pitchFamily="18" charset="-127"/>
               </a:rPr>
-              <a:t>버튼을 누르면 </a:t>
+              <a:t>에서 </a:t>
             </a:r>
             <a:r>
               <a:rPr lang="en-US" altLang="ko-KR" sz="1400" dirty="0">
                 <a:latin typeface="a옛날목욕탕L" panose="02020600000000000000" pitchFamily="18" charset="-127"/>
                 <a:ea typeface="a옛날목욕탕L" panose="02020600000000000000" pitchFamily="18" charset="-127"/>
               </a:rPr>
-              <a:t>Bee Mobile Application</a:t>
+              <a:t>[</a:t>
             </a:r>
             <a:r>
               <a:rPr lang="ko-KR" altLang="en-US" sz="1400" dirty="0">
                 <a:latin typeface="a옛날목욕탕L" panose="02020600000000000000" pitchFamily="18" charset="-127"/>
                 <a:ea typeface="a옛날목욕탕L" panose="02020600000000000000" pitchFamily="18" charset="-127"/>
               </a:rPr>
-              <a:t>으로 </a:t>
+              <a:t>음성으로 듣기</a:t>
+            </a:r>
+            <a:r>
+              <a:rPr lang="en-US" altLang="ko-KR" sz="1400" dirty="0">
+                <a:latin typeface="a옛날목욕탕L" panose="02020600000000000000" pitchFamily="18" charset="-127"/>
+                <a:ea typeface="a옛날목욕탕L" panose="02020600000000000000" pitchFamily="18" charset="-127"/>
+              </a:rPr>
+              <a:t>]</a:t>
+            </a:r>
+            <a:r>
+              <a:rPr lang="ko-KR" altLang="en-US" sz="1400" dirty="0">
+                <a:latin typeface="a옛날목욕탕L" panose="02020600000000000000" pitchFamily="18" charset="-127"/>
+                <a:ea typeface="a옛날목욕탕L" panose="02020600000000000000" pitchFamily="18" charset="-127"/>
+              </a:rPr>
+              <a:t> </a:t>
             </a:r>
             <a:endParaRPr lang="en-US" altLang="ko-KR" sz="1400" dirty="0">
               <a:latin typeface="a옛날목욕탕L" panose="02020600000000000000" pitchFamily="18" charset="-127"/>
@@ -13128,108 +13299,41 @@
                 <a:latin typeface="a옛날목욕탕L" panose="02020600000000000000" pitchFamily="18" charset="-127"/>
                 <a:ea typeface="a옛날목욕탕L" panose="02020600000000000000" pitchFamily="18" charset="-127"/>
               </a:rPr>
-              <a:t>전송된다</a:t>
+              <a:t>아이콘을 선택하면</a:t>
             </a:r>
             <a:r>
               <a:rPr lang="en-US" altLang="ko-KR" sz="1400" dirty="0">
                 <a:latin typeface="a옛날목욕탕L" panose="02020600000000000000" pitchFamily="18" charset="-127"/>
                 <a:ea typeface="a옛날목욕탕L" panose="02020600000000000000" pitchFamily="18" charset="-127"/>
               </a:rPr>
-              <a:t>.</a:t>
-            </a:r>
-          </a:p>
-          <a:p>
-            <a:endParaRPr lang="en-US" altLang="ko-KR" sz="1400" dirty="0">
-              <a:latin typeface="a옛날목욕탕L" panose="02020600000000000000" pitchFamily="18" charset="-127"/>
-              <a:ea typeface="a옛날목욕탕L" panose="02020600000000000000" pitchFamily="18" charset="-127"/>
-            </a:endParaRPr>
-          </a:p>
-          <a:p>
-            <a:pPr marL="342900" indent="-342900">
-              <a:buFont typeface="+mj-ea"/>
-              <a:buAutoNum type="circleNumDbPlain" startAt="2"/>
-            </a:pPr>
-            <a:r>
+              <a:t>, </a:t>
+            </a:r>
+            <a:r>
+              <a:rPr lang="ko-KR" altLang="en-US" sz="1400" dirty="0">
+                <a:latin typeface="a옛날목욕탕L" panose="02020600000000000000" pitchFamily="18" charset="-127"/>
+                <a:ea typeface="a옛날목욕탕L" panose="02020600000000000000" pitchFamily="18" charset="-127"/>
+              </a:rPr>
+              <a:t>전송 받은 메시지를 </a:t>
+            </a:r>
+            <a:br>
               <a:rPr lang="en-US" altLang="ko-KR" sz="1400" dirty="0">
                 <a:latin typeface="a옛날목욕탕L" panose="02020600000000000000" pitchFamily="18" charset="-127"/>
                 <a:ea typeface="a옛날목욕탕L" panose="02020600000000000000" pitchFamily="18" charset="-127"/>
               </a:rPr>
-              <a:t>BEE Mobile Application</a:t>
+            </a:br>
+            <a:r>
+              <a:rPr lang="en-US" altLang="ko-KR" sz="1400" dirty="0">
+                <a:latin typeface="a옛날목욕탕L" panose="02020600000000000000" pitchFamily="18" charset="-127"/>
+                <a:ea typeface="a옛날목욕탕L" panose="02020600000000000000" pitchFamily="18" charset="-127"/>
+              </a:rPr>
+              <a:t>      </a:t>
             </a:r>
             <a:r>
               <a:rPr lang="ko-KR" altLang="en-US" sz="1400" dirty="0">
                 <a:latin typeface="a옛날목욕탕L" panose="02020600000000000000" pitchFamily="18" charset="-127"/>
                 <a:ea typeface="a옛날목욕탕L" panose="02020600000000000000" pitchFamily="18" charset="-127"/>
               </a:rPr>
-              <a:t>에서 </a:t>
-            </a:r>
-            <a:r>
-              <a:rPr lang="en-US" altLang="ko-KR" sz="1400" dirty="0">
-                <a:latin typeface="a옛날목욕탕L" panose="02020600000000000000" pitchFamily="18" charset="-127"/>
-                <a:ea typeface="a옛날목욕탕L" panose="02020600000000000000" pitchFamily="18" charset="-127"/>
-              </a:rPr>
-              <a:t>[</a:t>
-            </a:r>
-            <a:r>
-              <a:rPr lang="ko-KR" altLang="en-US" sz="1400" dirty="0">
-                <a:latin typeface="a옛날목욕탕L" panose="02020600000000000000" pitchFamily="18" charset="-127"/>
-                <a:ea typeface="a옛날목욕탕L" panose="02020600000000000000" pitchFamily="18" charset="-127"/>
-              </a:rPr>
-              <a:t>음성으로 듣기</a:t>
-            </a:r>
-            <a:r>
-              <a:rPr lang="en-US" altLang="ko-KR" sz="1400" dirty="0">
-                <a:latin typeface="a옛날목욕탕L" panose="02020600000000000000" pitchFamily="18" charset="-127"/>
-                <a:ea typeface="a옛날목욕탕L" panose="02020600000000000000" pitchFamily="18" charset="-127"/>
-              </a:rPr>
-              <a:t>]</a:t>
-            </a:r>
-            <a:r>
-              <a:rPr lang="ko-KR" altLang="en-US" sz="1400" dirty="0">
-                <a:latin typeface="a옛날목욕탕L" panose="02020600000000000000" pitchFamily="18" charset="-127"/>
-                <a:ea typeface="a옛날목욕탕L" panose="02020600000000000000" pitchFamily="18" charset="-127"/>
-              </a:rPr>
-              <a:t> </a:t>
-            </a:r>
-            <a:endParaRPr lang="en-US" altLang="ko-KR" sz="1400" dirty="0">
-              <a:latin typeface="a옛날목욕탕L" panose="02020600000000000000" pitchFamily="18" charset="-127"/>
-              <a:ea typeface="a옛날목욕탕L" panose="02020600000000000000" pitchFamily="18" charset="-127"/>
-            </a:endParaRPr>
-          </a:p>
-          <a:p>
-            <a:r>
-              <a:rPr lang="en-US" altLang="ko-KR" sz="1400" dirty="0">
-                <a:latin typeface="a옛날목욕탕L" panose="02020600000000000000" pitchFamily="18" charset="-127"/>
-                <a:ea typeface="a옛날목욕탕L" panose="02020600000000000000" pitchFamily="18" charset="-127"/>
-              </a:rPr>
-              <a:t>      </a:t>
-            </a:r>
-            <a:r>
-              <a:rPr lang="ko-KR" altLang="en-US" sz="1400" dirty="0">
-                <a:latin typeface="a옛날목욕탕L" panose="02020600000000000000" pitchFamily="18" charset="-127"/>
-                <a:ea typeface="a옛날목욕탕L" panose="02020600000000000000" pitchFamily="18" charset="-127"/>
-              </a:rPr>
-              <a:t>아이콘을 선택할 시 해당 메시지를 음성으로 </a:t>
-            </a:r>
-            <a:endParaRPr lang="en-US" altLang="ko-KR" sz="1400" dirty="0">
-              <a:latin typeface="a옛날목욕탕L" panose="02020600000000000000" pitchFamily="18" charset="-127"/>
-              <a:ea typeface="a옛날목욕탕L" panose="02020600000000000000" pitchFamily="18" charset="-127"/>
-            </a:endParaRPr>
-          </a:p>
-          <a:p>
-            <a:r>
-              <a:rPr lang="en-US" altLang="ko-KR" sz="1400" dirty="0">
-                <a:latin typeface="a옛날목욕탕L" panose="02020600000000000000" pitchFamily="18" charset="-127"/>
-                <a:ea typeface="a옛날목욕탕L" panose="02020600000000000000" pitchFamily="18" charset="-127"/>
-              </a:rPr>
-              <a:t>      </a:t>
-            </a:r>
-            <a:r>
-              <a:rPr lang="ko-KR" altLang="en-US" sz="1400" dirty="0">
-                <a:latin typeface="a옛날목욕탕L" panose="02020600000000000000" pitchFamily="18" charset="-127"/>
-                <a:ea typeface="a옛날목욕탕L" panose="02020600000000000000" pitchFamily="18" charset="-127"/>
-              </a:rPr>
-              <a:t>확인할 수 있다</a:t>
+              <a:t>음성으로 확인할 수 있다</a:t>
             </a:r>
             <a:r>
               <a:rPr lang="en-US" altLang="ko-KR" sz="1400" dirty="0">
@@ -13528,7 +13632,7 @@
                 <a:latin typeface="a옛날목욕탕L" panose="02020600000000000000" pitchFamily="18" charset="-127"/>
                 <a:ea typeface="a옛날목욕탕L" panose="02020600000000000000" pitchFamily="18" charset="-127"/>
               </a:rPr>
-              <a:t>채팅기능</a:t>
+              <a:t>채팅 기능</a:t>
             </a:r>
             <a:endParaRPr lang="ko-KR" altLang="ko-KR" sz="1600" dirty="0">
               <a:latin typeface="a옛날목욕탕L" panose="02020600000000000000" pitchFamily="18" charset="-127"/>
@@ -15276,12 +15380,20 @@
               <a:t> </a:t>
             </a:r>
             <a:r>
+              <a:rPr lang="ko-KR" altLang="en-US" sz="1200" dirty="0">
+                <a:latin typeface="a옛날목욕탕L" panose="02020600000000000000" pitchFamily="18" charset="-127"/>
+                <a:ea typeface="a옛날목욕탕L" panose="02020600000000000000" pitchFamily="18" charset="-127"/>
+                <a:cs typeface="Arial" panose="020B0604020202020204" pitchFamily="34" charset="0"/>
+              </a:rPr>
+              <a:t>입력 받은 점</a:t>
+            </a:r>
+            <a:r>
               <a:rPr lang="ko-KR" altLang="ko-KR" sz="1200" dirty="0">
                 <a:latin typeface="a옛날목욕탕L" panose="02020600000000000000" pitchFamily="18" charset="-127"/>
                 <a:ea typeface="a옛날목욕탕L" panose="02020600000000000000" pitchFamily="18" charset="-127"/>
                 <a:cs typeface="Arial" panose="020B0604020202020204" pitchFamily="34" charset="0"/>
               </a:rPr>
-              <a:t>점자 정보</a:t>
+              <a:t>자 정보</a:t>
             </a:r>
             <a:r>
               <a:rPr lang="ko-KR" altLang="en-US" sz="1200" dirty="0">
@@ -15289,7 +15401,7 @@
                 <a:ea typeface="a옛날목욕탕L" panose="02020600000000000000" pitchFamily="18" charset="-127"/>
                 <a:cs typeface="Arial" panose="020B0604020202020204" pitchFamily="34" charset="0"/>
               </a:rPr>
-              <a:t>를 입력 받으면 </a:t>
+              <a:t>는 </a:t>
             </a:r>
             <a:r>
               <a:rPr lang="en-US" altLang="ko-KR" sz="1200" dirty="0">
@@ -15701,23 +15813,7 @@
                 <a:ea typeface="a옛날목욕탕L" panose="02020600000000000000" pitchFamily="18" charset="-127"/>
                 <a:cs typeface="Arial" panose="020B0604020202020204" pitchFamily="34" charset="0"/>
               </a:rPr>
-              <a:t> </a:t>
-            </a:r>
-            <a:r>
-              <a:rPr lang="ko-KR" altLang="en-US" sz="1400" dirty="0">
-                <a:latin typeface="a옛날목욕탕L" panose="02020600000000000000" pitchFamily="18" charset="-127"/>
-                <a:ea typeface="a옛날목욕탕L" panose="02020600000000000000" pitchFamily="18" charset="-127"/>
-                <a:cs typeface="Arial" panose="020B0604020202020204" pitchFamily="34" charset="0"/>
-              </a:rPr>
-              <a:t>및</a:t>
-            </a:r>
-            <a:r>
-              <a:rPr lang="en-US" altLang="ko-KR" sz="1400" dirty="0">
-                <a:latin typeface="a옛날목욕탕L" panose="02020600000000000000" pitchFamily="18" charset="-127"/>
-                <a:ea typeface="a옛날목욕탕L" panose="02020600000000000000" pitchFamily="18" charset="-127"/>
-                <a:cs typeface="Arial" panose="020B0604020202020204" pitchFamily="34" charset="0"/>
-              </a:rPr>
-              <a:t> BEE Device</a:t>
+              <a:t> or BEE Device</a:t>
             </a:r>
             <a:r>
               <a:rPr lang="ko-KR" altLang="ko-KR" sz="1400" dirty="0">
@@ -16157,11 +16253,11 @@
               <a:t>2. </a:t>
             </a:r>
             <a:r>
-              <a:rPr lang="ko-KR" altLang="en-US" dirty="0">
-                <a:latin typeface="a옛날목욕탕L" panose="02020600000000000000" pitchFamily="18" charset="-127"/>
-                <a:ea typeface="a옛날목욕탕L" panose="02020600000000000000" pitchFamily="18" charset="-127"/>
-              </a:rPr>
-              <a:t>사전 검색기능</a:t>
+              <a:rPr lang="ko-KR" altLang="en-US">
+                <a:latin typeface="a옛날목욕탕L" panose="02020600000000000000" pitchFamily="18" charset="-127"/>
+                <a:ea typeface="a옛날목욕탕L" panose="02020600000000000000" pitchFamily="18" charset="-127"/>
+              </a:rPr>
+              <a:t>사전 검색 기능</a:t>
             </a:r>
             <a:endParaRPr lang="ko-KR" altLang="ko-KR" sz="1600" dirty="0">
               <a:latin typeface="a옛날목욕탕L" panose="02020600000000000000" pitchFamily="18" charset="-127"/>
@@ -17691,7 +17787,7 @@
         </p:nvSpPr>
         <p:spPr>
           <a:xfrm>
-            <a:off x="6096000" y="2671630"/>
+            <a:off x="6096000" y="2854788"/>
             <a:ext cx="6015317" cy="2369880"/>
           </a:xfrm>
           <a:prstGeom prst="rect">
@@ -17888,23 +17984,7 @@
                 <a:ea typeface="a옛날목욕탕L" panose="02020600000000000000" pitchFamily="18" charset="-127"/>
                 <a:cs typeface="Arial" panose="020B0604020202020204" pitchFamily="34" charset="0"/>
               </a:rPr>
-              <a:t>점</a:t>
-            </a:r>
-            <a:r>
-              <a:rPr lang="ko-KR" altLang="ko-KR" sz="1200" dirty="0">
-                <a:latin typeface="a옛날목욕탕L" panose="02020600000000000000" pitchFamily="18" charset="-127"/>
-                <a:ea typeface="a옛날목욕탕L" panose="02020600000000000000" pitchFamily="18" charset="-127"/>
-                <a:cs typeface="Arial" panose="020B0604020202020204" pitchFamily="34" charset="0"/>
-              </a:rPr>
-              <a:t>자 정보</a:t>
-            </a:r>
-            <a:r>
-              <a:rPr lang="ko-KR" altLang="en-US" sz="1200" dirty="0">
-                <a:latin typeface="a옛날목욕탕L" panose="02020600000000000000" pitchFamily="18" charset="-127"/>
-                <a:ea typeface="a옛날목욕탕L" panose="02020600000000000000" pitchFamily="18" charset="-127"/>
-                <a:cs typeface="Arial" panose="020B0604020202020204" pitchFamily="34" charset="0"/>
-              </a:rPr>
-              <a:t>를 입력 받으면 </a:t>
+              <a:t>입력 받은 점자 정보는 </a:t>
             </a:r>
             <a:r>
               <a:rPr lang="en-US" altLang="ko-KR" sz="1200" dirty="0">
@@ -18133,14 +18213,14 @@
                 <a:latin typeface="a옛날목욕탕L" panose="02020600000000000000" pitchFamily="18" charset="-127"/>
                 <a:ea typeface="a옛날목욕탕L" panose="02020600000000000000" pitchFamily="18" charset="-127"/>
               </a:rPr>
-              <a:t>, BEE Device</a:t>
-            </a:r>
-            <a:r>
-              <a:rPr lang="ko-KR" altLang="ko-KR" sz="1200" dirty="0">
-                <a:latin typeface="a옛날목욕탕L" panose="02020600000000000000" pitchFamily="18" charset="-127"/>
-                <a:ea typeface="a옛날목욕탕L" panose="02020600000000000000" pitchFamily="18" charset="-127"/>
-              </a:rPr>
-              <a:t>의 점자 출력부를 통해 </a:t>
+              <a:t>, </a:t>
+            </a:r>
+            <a:r>
+              <a:rPr lang="ko-KR" altLang="en-US" sz="1200" dirty="0">
+                <a:latin typeface="a옛날목욕탕L" panose="02020600000000000000" pitchFamily="18" charset="-127"/>
+                <a:ea typeface="a옛날목욕탕L" panose="02020600000000000000" pitchFamily="18" charset="-127"/>
+              </a:rPr>
+              <a:t>해당 검색 결과를 점자로 변환하여 </a:t>
             </a:r>
             <a:endParaRPr lang="en-US" altLang="ko-KR" sz="1200" dirty="0">
               <a:latin typeface="a옛날목욕탕L" panose="02020600000000000000" pitchFamily="18" charset="-127"/>
@@ -18161,14 +18241,14 @@
                 <a:latin typeface="a옛날목욕탕L" panose="02020600000000000000" pitchFamily="18" charset="-127"/>
                 <a:ea typeface="a옛날목욕탕L" panose="02020600000000000000" pitchFamily="18" charset="-127"/>
               </a:rPr>
-              <a:t>          </a:t>
+              <a:t>          BEE Device</a:t>
             </a:r>
             <a:r>
               <a:rPr lang="ko-KR" altLang="ko-KR" sz="1200" dirty="0">
                 <a:latin typeface="a옛날목욕탕L" panose="02020600000000000000" pitchFamily="18" charset="-127"/>
                 <a:ea typeface="a옛날목욕탕L" panose="02020600000000000000" pitchFamily="18" charset="-127"/>
               </a:rPr>
-              <a:t>출력하는 기능을 제공한다</a:t>
+              <a:t>의 점자 출력부를 통해 출력하는 기능을 제공한다</a:t>
             </a:r>
             <a:r>
               <a:rPr lang="en-US" altLang="ko-KR" sz="1200" dirty="0">
@@ -19006,7 +19086,7 @@
                 <a:latin typeface="a옛날목욕탕L" panose="02020600000000000000" pitchFamily="18" charset="-127"/>
                 <a:ea typeface="a옛날목욕탕L" panose="02020600000000000000" pitchFamily="18" charset="-127"/>
               </a:rPr>
-              <a:t>어플리케이션에 인터넷을 이용할 수 있는 기능 추가</a:t>
+              <a:t>모바일 어플리케이션에 인터넷을 이용할 수 있는 기능 추가</a:t>
             </a:r>
             <a:endParaRPr lang="en-US" altLang="ko-KR" sz="1400" dirty="0">
               <a:latin typeface="a옛날목욕탕L" panose="02020600000000000000" pitchFamily="18" charset="-127"/>

</xml_diff>